<commit_message>
Updated M4 marking slides
</commit_message>
<xml_diff>
--- a/Week07-08/M4_slides/Lab4_2.pptx
+++ b/Week07-08/M4_slides/Lab4_2.pptx
@@ -9,8 +9,8 @@
   </p:notesMasterIdLst>
   <p:sldIdLst>
     <p:sldId id="299" r:id="rId2"/>
-    <p:sldId id="300" r:id="rId3"/>
-    <p:sldId id="302" r:id="rId4"/>
+    <p:sldId id="302" r:id="rId3"/>
+    <p:sldId id="300" r:id="rId4"/>
     <p:sldId id="301" r:id="rId5"/>
     <p:sldId id="275" r:id="rId6"/>
     <p:sldId id="276" r:id="rId7"/>
@@ -205,7 +205,7 @@
           <a:p>
             <a:fld id="{A9407A57-47BC-45C1-B9EB-906F4463B0AB}" type="datetimeFigureOut">
               <a:rPr lang="en-AU" smtClean="0"/>
-              <a:t>5/09/2024</a:t>
+              <a:t>15/09/2024</a:t>
             </a:fld>
             <a:endParaRPr lang="en-AU"/>
           </a:p>
@@ -641,7 +641,7 @@
           <a:p>
             <a:fld id="{1205BC88-DBF0-4610-A802-A09E0A6ECD22}" type="datetimeFigureOut">
               <a:rPr lang="en-AU" smtClean="0"/>
-              <a:t>5/09/2024</a:t>
+              <a:t>15/09/2024</a:t>
             </a:fld>
             <a:endParaRPr lang="en-AU"/>
           </a:p>
@@ -869,7 +869,7 @@
           <a:p>
             <a:fld id="{1205BC88-DBF0-4610-A802-A09E0A6ECD22}" type="datetimeFigureOut">
               <a:rPr lang="en-AU" smtClean="0"/>
-              <a:t>5/09/2024</a:t>
+              <a:t>15/09/2024</a:t>
             </a:fld>
             <a:endParaRPr lang="en-AU"/>
           </a:p>
@@ -1049,7 +1049,7 @@
           <a:p>
             <a:fld id="{1205BC88-DBF0-4610-A802-A09E0A6ECD22}" type="datetimeFigureOut">
               <a:rPr lang="en-AU" smtClean="0"/>
-              <a:t>5/09/2024</a:t>
+              <a:t>15/09/2024</a:t>
             </a:fld>
             <a:endParaRPr lang="en-AU"/>
           </a:p>
@@ -1219,7 +1219,7 @@
           <a:p>
             <a:fld id="{1205BC88-DBF0-4610-A802-A09E0A6ECD22}" type="datetimeFigureOut">
               <a:rPr lang="en-AU" smtClean="0"/>
-              <a:t>5/09/2024</a:t>
+              <a:t>15/09/2024</a:t>
             </a:fld>
             <a:endParaRPr lang="en-AU"/>
           </a:p>
@@ -1473,7 +1473,7 @@
           <a:p>
             <a:fld id="{1205BC88-DBF0-4610-A802-A09E0A6ECD22}" type="datetimeFigureOut">
               <a:rPr lang="en-AU" smtClean="0"/>
-              <a:t>5/09/2024</a:t>
+              <a:t>15/09/2024</a:t>
             </a:fld>
             <a:endParaRPr lang="en-AU"/>
           </a:p>
@@ -1799,7 +1799,7 @@
           <a:p>
             <a:fld id="{1205BC88-DBF0-4610-A802-A09E0A6ECD22}" type="datetimeFigureOut">
               <a:rPr lang="en-AU" smtClean="0"/>
-              <a:t>5/09/2024</a:t>
+              <a:t>15/09/2024</a:t>
             </a:fld>
             <a:endParaRPr lang="en-AU"/>
           </a:p>
@@ -2250,7 +2250,7 @@
           <a:p>
             <a:fld id="{1205BC88-DBF0-4610-A802-A09E0A6ECD22}" type="datetimeFigureOut">
               <a:rPr lang="en-AU" smtClean="0"/>
-              <a:t>5/09/2024</a:t>
+              <a:t>15/09/2024</a:t>
             </a:fld>
             <a:endParaRPr lang="en-AU"/>
           </a:p>
@@ -2368,7 +2368,7 @@
           <a:p>
             <a:fld id="{1205BC88-DBF0-4610-A802-A09E0A6ECD22}" type="datetimeFigureOut">
               <a:rPr lang="en-AU" smtClean="0"/>
-              <a:t>5/09/2024</a:t>
+              <a:t>15/09/2024</a:t>
             </a:fld>
             <a:endParaRPr lang="en-AU"/>
           </a:p>
@@ -2463,7 +2463,7 @@
           <a:p>
             <a:fld id="{1205BC88-DBF0-4610-A802-A09E0A6ECD22}" type="datetimeFigureOut">
               <a:rPr lang="en-AU" smtClean="0"/>
-              <a:t>5/09/2024</a:t>
+              <a:t>15/09/2024</a:t>
             </a:fld>
             <a:endParaRPr lang="en-AU"/>
           </a:p>
@@ -2750,7 +2750,7 @@
           <a:p>
             <a:fld id="{1205BC88-DBF0-4610-A802-A09E0A6ECD22}" type="datetimeFigureOut">
               <a:rPr lang="en-AU" smtClean="0"/>
-              <a:t>5/09/2024</a:t>
+              <a:t>15/09/2024</a:t>
             </a:fld>
             <a:endParaRPr lang="en-AU"/>
           </a:p>
@@ -3072,7 +3072,7 @@
           <a:p>
             <a:fld id="{1205BC88-DBF0-4610-A802-A09E0A6ECD22}" type="datetimeFigureOut">
               <a:rPr lang="en-AU" smtClean="0"/>
-              <a:t>5/09/2024</a:t>
+              <a:t>15/09/2024</a:t>
             </a:fld>
             <a:endParaRPr lang="en-AU"/>
           </a:p>
@@ -3326,7 +3326,7 @@
           <a:p>
             <a:fld id="{1205BC88-DBF0-4610-A802-A09E0A6ECD22}" type="datetimeFigureOut">
               <a:rPr lang="en-AU" smtClean="0"/>
-              <a:t>5/09/2024</a:t>
+              <a:t>15/09/2024</a:t>
             </a:fld>
             <a:endParaRPr lang="en-AU"/>
           </a:p>
@@ -4064,219 +4064,6 @@
           <a:chExt cx="0" cy="0"/>
         </a:xfrm>
       </p:grpSpPr>
-      <p:sp>
-        <p:nvSpPr>
-          <p:cNvPr id="50" name="TextBox 49">
-            <a:extLst>
-              <a:ext uri="{FF2B5EF4-FFF2-40B4-BE49-F238E27FC236}">
-                <a16:creationId xmlns:a16="http://schemas.microsoft.com/office/drawing/2014/main" id="{BF948A99-782B-4139-A61F-6C2663DAEB76}"/>
-              </a:ext>
-            </a:extLst>
-          </p:cNvPr>
-          <p:cNvSpPr txBox="1"/>
-          <p:nvPr/>
-        </p:nvSpPr>
-        <p:spPr>
-          <a:xfrm>
-            <a:off x="478180" y="7379"/>
-            <a:ext cx="11713820" cy="830997"/>
-          </a:xfrm>
-          <a:prstGeom prst="rect">
-            <a:avLst/>
-          </a:prstGeom>
-          <a:noFill/>
-        </p:spPr>
-        <p:txBody>
-          <a:bodyPr wrap="square" rtlCol="0">
-            <a:spAutoFit/>
-          </a:bodyPr>
-          <a:lstStyle/>
-          <a:p>
-            <a:pPr algn="ctr"/>
-            <a:r>
-              <a:rPr lang="en-AU" sz="4800" dirty="0"/>
-              <a:t>M4: Navigation and Planning</a:t>
-            </a:r>
-          </a:p>
-        </p:txBody>
-      </p:sp>
-      <p:sp>
-        <p:nvSpPr>
-          <p:cNvPr id="4" name="TextBox 3">
-            <a:extLst>
-              <a:ext uri="{FF2B5EF4-FFF2-40B4-BE49-F238E27FC236}">
-                <a16:creationId xmlns:a16="http://schemas.microsoft.com/office/drawing/2014/main" id="{CA0B27D3-7B85-4485-A10E-AAC012A9B3BB}"/>
-              </a:ext>
-            </a:extLst>
-          </p:cNvPr>
-          <p:cNvSpPr txBox="1"/>
-          <p:nvPr/>
-        </p:nvSpPr>
-        <p:spPr>
-          <a:xfrm>
-            <a:off x="478180" y="806896"/>
-            <a:ext cx="11527007" cy="5355312"/>
-          </a:xfrm>
-          <a:prstGeom prst="rect">
-            <a:avLst/>
-          </a:prstGeom>
-          <a:noFill/>
-        </p:spPr>
-        <p:txBody>
-          <a:bodyPr wrap="square" rtlCol="0">
-            <a:spAutoFit/>
-          </a:bodyPr>
-          <a:lstStyle/>
-          <a:p>
-            <a:r>
-              <a:rPr lang="en-US" dirty="0"/>
-              <a:t>M4 focuses on navigation and planning</a:t>
-            </a:r>
-          </a:p>
-          <a:p>
-            <a:r>
-              <a:rPr lang="en-US" dirty="0"/>
-              <a:t>	</a:t>
-            </a:r>
-            <a:r>
-              <a:rPr lang="en-US" dirty="0" err="1"/>
-              <a:t>PenguinPi</a:t>
-            </a:r>
-            <a:r>
-              <a:rPr lang="en-US" dirty="0"/>
-              <a:t> now knows where things are and needs to plan its way around the supermarket and get 	</a:t>
-            </a:r>
-            <a:r>
-              <a:rPr lang="en-US" dirty="0" err="1"/>
-              <a:t>fruits&amp;vegs</a:t>
-            </a:r>
-            <a:r>
-              <a:rPr lang="en-US" dirty="0"/>
-              <a:t> on its shopping list</a:t>
-            </a:r>
-          </a:p>
-          <a:p>
-            <a:endParaRPr lang="en-US" dirty="0"/>
-          </a:p>
-          <a:p>
-            <a:r>
-              <a:rPr lang="en-US" dirty="0"/>
-              <a:t>	Your task will be to semi OR fully autonomously navigate and path plan around the arena to targets 	in a specified order</a:t>
-            </a:r>
-          </a:p>
-          <a:p>
-            <a:r>
-              <a:rPr lang="en-US" dirty="0"/>
-              <a:t>	</a:t>
-            </a:r>
-          </a:p>
-          <a:p>
-            <a:r>
-              <a:rPr lang="en-US" dirty="0"/>
-              <a:t>The arena will always contain:</a:t>
-            </a:r>
-          </a:p>
-          <a:p>
-            <a:r>
-              <a:rPr lang="en-US" dirty="0"/>
-              <a:t>	10 </a:t>
-            </a:r>
-            <a:r>
-              <a:rPr lang="en-US" dirty="0" err="1"/>
-              <a:t>ArUco</a:t>
-            </a:r>
-            <a:r>
-              <a:rPr lang="en-US" dirty="0"/>
-              <a:t> markers</a:t>
-            </a:r>
-          </a:p>
-          <a:p>
-            <a:r>
-              <a:rPr lang="en-US" dirty="0"/>
-              <a:t>	10 </a:t>
-            </a:r>
-            <a:r>
-              <a:rPr lang="en-US" dirty="0" err="1"/>
-              <a:t>Fruits&amp;Vegs</a:t>
-            </a:r>
-            <a:endParaRPr lang="en-US" dirty="0"/>
-          </a:p>
-          <a:p>
-            <a:r>
-              <a:rPr lang="en-US" dirty="0"/>
-              <a:t>	</a:t>
-            </a:r>
-            <a:r>
-              <a:rPr lang="en-US" dirty="0" err="1"/>
-              <a:t>Groundtruth</a:t>
-            </a:r>
-            <a:r>
-              <a:rPr lang="en-US" dirty="0"/>
-              <a:t> maps are given for M4 ONLY (practice map in repo)</a:t>
-            </a:r>
-          </a:p>
-          <a:p>
-            <a:endParaRPr lang="en-US" dirty="0"/>
-          </a:p>
-          <a:p>
-            <a:endParaRPr lang="en-US" dirty="0"/>
-          </a:p>
-          <a:p>
-            <a:r>
-              <a:rPr lang="en-US" dirty="0"/>
-              <a:t>You will be given a shopping list that contains 5 targets in the order for the robot to navigate to</a:t>
-            </a:r>
-          </a:p>
-          <a:p>
-            <a:r>
-              <a:rPr lang="en-US" dirty="0"/>
-              <a:t>	The 5 targets will be unique, the 5 obstacles may contain duplicates of other types</a:t>
-            </a:r>
-          </a:p>
-          <a:p>
-            <a:endParaRPr lang="en-US" dirty="0"/>
-          </a:p>
-          <a:p>
-            <a:r>
-              <a:rPr lang="en-US" dirty="0"/>
-              <a:t>	To “pick up” a target you must stop the robot for 2 seconds (doesn’t need to be exact) whilst being 	within 0.5m of the target</a:t>
-            </a:r>
-          </a:p>
-          <a:p>
-            <a:endParaRPr lang="en-US" dirty="0"/>
-          </a:p>
-        </p:txBody>
-      </p:sp>
-    </p:spTree>
-    <p:extLst>
-      <p:ext uri="{BB962C8B-B14F-4D97-AF65-F5344CB8AC3E}">
-        <p14:creationId xmlns:p14="http://schemas.microsoft.com/office/powerpoint/2010/main" val="646232702"/>
-      </p:ext>
-    </p:extLst>
-  </p:cSld>
-  <p:clrMapOvr>
-    <a:masterClrMapping/>
-  </p:clrMapOvr>
-</p:sld>
-</file>
-
-<file path=ppt/slides/slide3.xml><?xml version="1.0" encoding="utf-8"?>
-<p:sld xmlns:a="http://schemas.openxmlformats.org/drawingml/2006/main" xmlns:r="http://schemas.openxmlformats.org/officeDocument/2006/relationships" xmlns:p="http://schemas.openxmlformats.org/presentationml/2006/main">
-  <p:cSld>
-    <p:spTree>
-      <p:nvGrpSpPr>
-        <p:cNvPr id="1" name=""/>
-        <p:cNvGrpSpPr/>
-        <p:nvPr/>
-      </p:nvGrpSpPr>
-      <p:grpSpPr>
-        <a:xfrm>
-          <a:off x="0" y="0"/>
-          <a:ext cx="0" cy="0"/>
-          <a:chOff x="0" y="0"/>
-          <a:chExt cx="0" cy="0"/>
-        </a:xfrm>
-      </p:grpSpPr>
       <p:graphicFrame>
         <p:nvGraphicFramePr>
           <p:cNvPr id="8" name="Table 3">
@@ -6805,6 +6592,219 @@
     <p:extLst>
       <p:ext uri="{BB962C8B-B14F-4D97-AF65-F5344CB8AC3E}">
         <p14:creationId xmlns:p14="http://schemas.microsoft.com/office/powerpoint/2010/main" val="821578956"/>
+      </p:ext>
+    </p:extLst>
+  </p:cSld>
+  <p:clrMapOvr>
+    <a:masterClrMapping/>
+  </p:clrMapOvr>
+</p:sld>
+</file>
+
+<file path=ppt/slides/slide3.xml><?xml version="1.0" encoding="utf-8"?>
+<p:sld xmlns:a="http://schemas.openxmlformats.org/drawingml/2006/main" xmlns:r="http://schemas.openxmlformats.org/officeDocument/2006/relationships" xmlns:p="http://schemas.openxmlformats.org/presentationml/2006/main">
+  <p:cSld>
+    <p:spTree>
+      <p:nvGrpSpPr>
+        <p:cNvPr id="1" name=""/>
+        <p:cNvGrpSpPr/>
+        <p:nvPr/>
+      </p:nvGrpSpPr>
+      <p:grpSpPr>
+        <a:xfrm>
+          <a:off x="0" y="0"/>
+          <a:ext cx="0" cy="0"/>
+          <a:chOff x="0" y="0"/>
+          <a:chExt cx="0" cy="0"/>
+        </a:xfrm>
+      </p:grpSpPr>
+      <p:sp>
+        <p:nvSpPr>
+          <p:cNvPr id="50" name="TextBox 49">
+            <a:extLst>
+              <a:ext uri="{FF2B5EF4-FFF2-40B4-BE49-F238E27FC236}">
+                <a16:creationId xmlns:a16="http://schemas.microsoft.com/office/drawing/2014/main" id="{BF948A99-782B-4139-A61F-6C2663DAEB76}"/>
+              </a:ext>
+            </a:extLst>
+          </p:cNvPr>
+          <p:cNvSpPr txBox="1"/>
+          <p:nvPr/>
+        </p:nvSpPr>
+        <p:spPr>
+          <a:xfrm>
+            <a:off x="478180" y="7379"/>
+            <a:ext cx="11713820" cy="830997"/>
+          </a:xfrm>
+          <a:prstGeom prst="rect">
+            <a:avLst/>
+          </a:prstGeom>
+          <a:noFill/>
+        </p:spPr>
+        <p:txBody>
+          <a:bodyPr wrap="square" rtlCol="0">
+            <a:spAutoFit/>
+          </a:bodyPr>
+          <a:lstStyle/>
+          <a:p>
+            <a:pPr algn="ctr"/>
+            <a:r>
+              <a:rPr lang="en-AU" sz="4800" dirty="0"/>
+              <a:t>M4: Navigation and Planning</a:t>
+            </a:r>
+          </a:p>
+        </p:txBody>
+      </p:sp>
+      <p:sp>
+        <p:nvSpPr>
+          <p:cNvPr id="4" name="TextBox 3">
+            <a:extLst>
+              <a:ext uri="{FF2B5EF4-FFF2-40B4-BE49-F238E27FC236}">
+                <a16:creationId xmlns:a16="http://schemas.microsoft.com/office/drawing/2014/main" id="{CA0B27D3-7B85-4485-A10E-AAC012A9B3BB}"/>
+              </a:ext>
+            </a:extLst>
+          </p:cNvPr>
+          <p:cNvSpPr txBox="1"/>
+          <p:nvPr/>
+        </p:nvSpPr>
+        <p:spPr>
+          <a:xfrm>
+            <a:off x="478180" y="806896"/>
+            <a:ext cx="11527007" cy="5355312"/>
+          </a:xfrm>
+          <a:prstGeom prst="rect">
+            <a:avLst/>
+          </a:prstGeom>
+          <a:noFill/>
+        </p:spPr>
+        <p:txBody>
+          <a:bodyPr wrap="square" rtlCol="0">
+            <a:spAutoFit/>
+          </a:bodyPr>
+          <a:lstStyle/>
+          <a:p>
+            <a:r>
+              <a:rPr lang="en-US" dirty="0"/>
+              <a:t>M4 focuses on navigation and planning</a:t>
+            </a:r>
+          </a:p>
+          <a:p>
+            <a:r>
+              <a:rPr lang="en-US" dirty="0"/>
+              <a:t>	</a:t>
+            </a:r>
+            <a:r>
+              <a:rPr lang="en-US" dirty="0" err="1"/>
+              <a:t>PenguinPi</a:t>
+            </a:r>
+            <a:r>
+              <a:rPr lang="en-US" dirty="0"/>
+              <a:t> now knows where things are and needs to plan its way around the supermarket and get 	</a:t>
+            </a:r>
+            <a:r>
+              <a:rPr lang="en-US" dirty="0" err="1"/>
+              <a:t>fruits&amp;vegs</a:t>
+            </a:r>
+            <a:r>
+              <a:rPr lang="en-US" dirty="0"/>
+              <a:t> on its shopping list</a:t>
+            </a:r>
+          </a:p>
+          <a:p>
+            <a:endParaRPr lang="en-US" dirty="0"/>
+          </a:p>
+          <a:p>
+            <a:r>
+              <a:rPr lang="en-US" dirty="0"/>
+              <a:t>	Your task will be to semi OR fully autonomously navigate and path plan around the arena to targets 	in a specified order</a:t>
+            </a:r>
+          </a:p>
+          <a:p>
+            <a:r>
+              <a:rPr lang="en-US" dirty="0"/>
+              <a:t>	</a:t>
+            </a:r>
+          </a:p>
+          <a:p>
+            <a:r>
+              <a:rPr lang="en-US" dirty="0"/>
+              <a:t>The arena will always contain:</a:t>
+            </a:r>
+          </a:p>
+          <a:p>
+            <a:r>
+              <a:rPr lang="en-US" dirty="0"/>
+              <a:t>	10 </a:t>
+            </a:r>
+            <a:r>
+              <a:rPr lang="en-US" dirty="0" err="1"/>
+              <a:t>ArUco</a:t>
+            </a:r>
+            <a:r>
+              <a:rPr lang="en-US" dirty="0"/>
+              <a:t> markers</a:t>
+            </a:r>
+          </a:p>
+          <a:p>
+            <a:r>
+              <a:rPr lang="en-US" dirty="0"/>
+              <a:t>	10 </a:t>
+            </a:r>
+            <a:r>
+              <a:rPr lang="en-US" dirty="0" err="1"/>
+              <a:t>Fruits&amp;Vegs</a:t>
+            </a:r>
+            <a:endParaRPr lang="en-US" dirty="0"/>
+          </a:p>
+          <a:p>
+            <a:r>
+              <a:rPr lang="en-US" dirty="0"/>
+              <a:t>	</a:t>
+            </a:r>
+            <a:r>
+              <a:rPr lang="en-US" dirty="0" err="1"/>
+              <a:t>Groundtruth</a:t>
+            </a:r>
+            <a:r>
+              <a:rPr lang="en-US" dirty="0"/>
+              <a:t> maps are given for M4 ONLY (practice map in repo)</a:t>
+            </a:r>
+          </a:p>
+          <a:p>
+            <a:endParaRPr lang="en-US" dirty="0"/>
+          </a:p>
+          <a:p>
+            <a:endParaRPr lang="en-US" dirty="0"/>
+          </a:p>
+          <a:p>
+            <a:r>
+              <a:rPr lang="en-US" dirty="0"/>
+              <a:t>You will be given a shopping list that contains 5 targets in the order for the robot to navigate to</a:t>
+            </a:r>
+          </a:p>
+          <a:p>
+            <a:r>
+              <a:rPr lang="en-US" dirty="0"/>
+              <a:t>	The 5 targets will be unique, the 5 obstacles may contain duplicates of other types</a:t>
+            </a:r>
+          </a:p>
+          <a:p>
+            <a:endParaRPr lang="en-US" dirty="0"/>
+          </a:p>
+          <a:p>
+            <a:r>
+              <a:rPr lang="en-US" dirty="0"/>
+              <a:t>	To “pick up” a target you must stop the robot for 2 seconds (doesn’t need to be exact) whilst being 	within 0.5m of the target</a:t>
+            </a:r>
+          </a:p>
+          <a:p>
+            <a:endParaRPr lang="en-US" dirty="0"/>
+          </a:p>
+        </p:txBody>
+      </p:sp>
+    </p:spTree>
+    <p:extLst>
+      <p:ext uri="{BB962C8B-B14F-4D97-AF65-F5344CB8AC3E}">
+        <p14:creationId xmlns:p14="http://schemas.microsoft.com/office/powerpoint/2010/main" val="646232702"/>
       </p:ext>
     </p:extLst>
   </p:cSld>
@@ -8216,7 +8216,11 @@
           <a:lstStyle/>
           <a:p>
             <a:r>
-              <a:rPr lang="en-US" dirty="0"/>
+              <a:rPr lang="en-US" dirty="0">
+                <a:solidFill>
+                  <a:srgbClr val="FFFF00"/>
+                </a:solidFill>
+              </a:rPr>
               <a:t>(see M4_marking.md for more info)</a:t>
             </a:r>
           </a:p>
@@ -8249,7 +8253,7 @@
           <a:p>
             <a:r>
               <a:rPr lang="en-US" dirty="0"/>
-              <a:t>	Your robot attempts to navigate to all 5 targets (stops within 1m radius) in the specified order</a:t>
+              <a:t>	Your robot attempts to navigate to (drive past within 1m radius) 3 targets in order (skips allowed)</a:t>
             </a:r>
           </a:p>
           <a:p>

</xml_diff>